<commit_message>
Presentation - added placeholder slides for objectives.
</commit_message>
<xml_diff>
--- a/presentation/teacher-student_planner.pptx
+++ b/presentation/teacher-student_planner.pptx
@@ -10,8 +10,10 @@
     <p:sldId id="259" r:id="rId4"/>
     <p:sldId id="260" r:id="rId5"/>
     <p:sldId id="261" r:id="rId6"/>
-    <p:sldId id="262" r:id="rId7"/>
-    <p:sldId id="263" r:id="rId8"/>
+    <p:sldId id="264" r:id="rId7"/>
+    <p:sldId id="265" r:id="rId8"/>
+    <p:sldId id="262" r:id="rId9"/>
+    <p:sldId id="263" r:id="rId10"/>
   </p:sldIdLst>
   <p:sldSz cx="9144000" cy="6858000" type="screen4x3"/>
   <p:notesSz cx="6858000" cy="9144000"/>
@@ -3769,14 +3771,12 @@
         </p:nvSpPr>
         <p:spPr/>
         <p:txBody>
-          <a:bodyPr>
-            <a:normAutofit/>
-          </a:bodyPr>
-          <a:lstStyle/>
-          <a:p>
-            <a:r>
-              <a:rPr lang="en-US" dirty="0" smtClean="0"/>
-              <a:t>Demo</a:t>
+          <a:bodyPr/>
+          <a:lstStyle/>
+          <a:p>
+            <a:r>
+              <a:rPr lang="en-US" dirty="0" smtClean="0"/>
+              <a:t>Objectives we met</a:t>
             </a:r>
             <a:endParaRPr lang="en-US" dirty="0"/>
           </a:p>
@@ -3810,6 +3810,142 @@
 </file>
 
 <file path=ppt/slides/slide7.xml><?xml version="1.0" encoding="utf-8"?>
+<p:sld xmlns:a="http://schemas.openxmlformats.org/drawingml/2006/main" xmlns:r="http://schemas.openxmlformats.org/officeDocument/2006/relationships" xmlns:p="http://schemas.openxmlformats.org/presentationml/2006/main">
+  <p:cSld>
+    <p:spTree>
+      <p:nvGrpSpPr>
+        <p:cNvPr id="1" name=""/>
+        <p:cNvGrpSpPr/>
+        <p:nvPr/>
+      </p:nvGrpSpPr>
+      <p:grpSpPr>
+        <a:xfrm>
+          <a:off x="0" y="0"/>
+          <a:ext cx="0" cy="0"/>
+          <a:chOff x="0" y="0"/>
+          <a:chExt cx="0" cy="0"/>
+        </a:xfrm>
+      </p:grpSpPr>
+      <p:sp>
+        <p:nvSpPr>
+          <p:cNvPr id="2" name="Title 1"/>
+          <p:cNvSpPr>
+            <a:spLocks noGrp="1"/>
+          </p:cNvSpPr>
+          <p:nvPr>
+            <p:ph type="title"/>
+          </p:nvPr>
+        </p:nvSpPr>
+        <p:spPr/>
+        <p:txBody>
+          <a:bodyPr/>
+          <a:lstStyle/>
+          <a:p>
+            <a:r>
+              <a:rPr lang="en-US" dirty="0" smtClean="0"/>
+              <a:t>Future objectives</a:t>
+            </a:r>
+            <a:endParaRPr lang="en-US" dirty="0"/>
+          </a:p>
+        </p:txBody>
+      </p:sp>
+      <p:sp>
+        <p:nvSpPr>
+          <p:cNvPr id="3" name="Content Placeholder 2"/>
+          <p:cNvSpPr>
+            <a:spLocks noGrp="1"/>
+          </p:cNvSpPr>
+          <p:nvPr>
+            <p:ph idx="1"/>
+          </p:nvPr>
+        </p:nvSpPr>
+        <p:spPr/>
+        <p:txBody>
+          <a:bodyPr/>
+          <a:lstStyle/>
+          <a:p>
+            <a:endParaRPr lang="en-US"/>
+          </a:p>
+        </p:txBody>
+      </p:sp>
+    </p:spTree>
+  </p:cSld>
+  <p:clrMapOvr>
+    <a:masterClrMapping/>
+  </p:clrMapOvr>
+</p:sld>
+</file>
+
+<file path=ppt/slides/slide8.xml><?xml version="1.0" encoding="utf-8"?>
+<p:sld xmlns:a="http://schemas.openxmlformats.org/drawingml/2006/main" xmlns:r="http://schemas.openxmlformats.org/officeDocument/2006/relationships" xmlns:p="http://schemas.openxmlformats.org/presentationml/2006/main">
+  <p:cSld>
+    <p:spTree>
+      <p:nvGrpSpPr>
+        <p:cNvPr id="1" name=""/>
+        <p:cNvGrpSpPr/>
+        <p:nvPr/>
+      </p:nvGrpSpPr>
+      <p:grpSpPr>
+        <a:xfrm>
+          <a:off x="0" y="0"/>
+          <a:ext cx="0" cy="0"/>
+          <a:chOff x="0" y="0"/>
+          <a:chExt cx="0" cy="0"/>
+        </a:xfrm>
+      </p:grpSpPr>
+      <p:sp>
+        <p:nvSpPr>
+          <p:cNvPr id="2" name="Title 1"/>
+          <p:cNvSpPr>
+            <a:spLocks noGrp="1"/>
+          </p:cNvSpPr>
+          <p:nvPr>
+            <p:ph type="title"/>
+          </p:nvPr>
+        </p:nvSpPr>
+        <p:spPr/>
+        <p:txBody>
+          <a:bodyPr>
+            <a:normAutofit/>
+          </a:bodyPr>
+          <a:lstStyle/>
+          <a:p>
+            <a:r>
+              <a:rPr lang="en-US" dirty="0" smtClean="0"/>
+              <a:t>Demo</a:t>
+            </a:r>
+            <a:endParaRPr lang="en-US" dirty="0"/>
+          </a:p>
+        </p:txBody>
+      </p:sp>
+      <p:sp>
+        <p:nvSpPr>
+          <p:cNvPr id="3" name="Content Placeholder 2"/>
+          <p:cNvSpPr>
+            <a:spLocks noGrp="1"/>
+          </p:cNvSpPr>
+          <p:nvPr>
+            <p:ph idx="1"/>
+          </p:nvPr>
+        </p:nvSpPr>
+        <p:spPr/>
+        <p:txBody>
+          <a:bodyPr/>
+          <a:lstStyle/>
+          <a:p>
+            <a:endParaRPr lang="en-US"/>
+          </a:p>
+        </p:txBody>
+      </p:sp>
+    </p:spTree>
+  </p:cSld>
+  <p:clrMapOvr>
+    <a:masterClrMapping/>
+  </p:clrMapOvr>
+</p:sld>
+</file>
+
+<file path=ppt/slides/slide9.xml><?xml version="1.0" encoding="utf-8"?>
 <p:sld xmlns:a="http://schemas.openxmlformats.org/drawingml/2006/main" xmlns:r="http://schemas.openxmlformats.org/officeDocument/2006/relationships" xmlns:p="http://schemas.openxmlformats.org/presentationml/2006/main">
   <p:cSld>
     <p:spTree>

</xml_diff>